<commit_message>
Fixed typo in WPF presentation
</commit_message>
<xml_diff>
--- a/Presentation/lesson-12.pptx
+++ b/Presentation/lesson-12.pptx
@@ -212,7 +212,7 @@
           <a:p>
             <a:fld id="{B24A7054-7FFB-49F4-A126-5DF6E687FF53}" type="datetimeFigureOut">
               <a:rPr lang="ru-RU" smtClean="0"/>
-              <a:t>06.11.2012</a:t>
+              <a:t>22.12.2012</a:t>
             </a:fld>
             <a:endParaRPr lang="ru-RU"/>
           </a:p>
@@ -1275,7 +1275,7 @@
           <a:p>
             <a:fld id="{8E6E6A2A-E9D3-4A0D-B04A-ABDD367A1E08}" type="datetimeFigureOut">
               <a:rPr lang="ru-RU" smtClean="0"/>
-              <a:t>06.11.2012</a:t>
+              <a:t>22.12.2012</a:t>
             </a:fld>
             <a:endParaRPr lang="ru-RU"/>
           </a:p>
@@ -2723,7 +2723,7 @@
           <a:p>
             <a:fld id="{AC3D3127-B7C4-45E3-9797-C527EC9FDD78}" type="datetimeFigureOut">
               <a:rPr lang="ru-RU" smtClean="0"/>
-              <a:t>06.11.2012</a:t>
+              <a:t>22.12.2012</a:t>
             </a:fld>
             <a:endParaRPr lang="ru-RU"/>
           </a:p>
@@ -3466,6 +3466,13 @@
   <p:clrMapOvr>
     <a:masterClrMapping/>
   </p:clrMapOvr>
+  <p:timing>
+    <p:tnLst>
+      <p:par>
+        <p:cTn id="1" dur="indefinite" restart="never" nodeType="tmRoot"/>
+      </p:par>
+    </p:tnLst>
+  </p:timing>
 </p:sld>
 </file>
 
@@ -3580,6 +3587,13 @@
   <p:clrMapOvr>
     <a:masterClrMapping/>
   </p:clrMapOvr>
+  <p:timing>
+    <p:tnLst>
+      <p:par>
+        <p:cTn id="1" dur="indefinite" restart="never" nodeType="tmRoot"/>
+      </p:par>
+    </p:tnLst>
+  </p:timing>
 </p:sld>
 </file>
 
@@ -3655,7 +3669,19 @@
           <a:p>
             <a:r>
               <a:rPr lang="ru-RU" dirty="0" smtClean="0"/>
-              <a:t>Хранится в ресурасх сборки</a:t>
+              <a:t>Хранится </a:t>
+            </a:r>
+            <a:r>
+              <a:rPr lang="ru-RU" smtClean="0"/>
+              <a:t>в </a:t>
+            </a:r>
+            <a:r>
+              <a:rPr lang="ru-RU" smtClean="0"/>
+              <a:t>ресурсах </a:t>
+            </a:r>
+            <a:r>
+              <a:rPr lang="ru-RU" dirty="0" smtClean="0"/>
+              <a:t>сборки</a:t>
             </a:r>
             <a:endParaRPr lang="en-US" dirty="0"/>
           </a:p>
@@ -3671,6 +3697,13 @@
   <p:clrMapOvr>
     <a:masterClrMapping/>
   </p:clrMapOvr>
+  <p:timing>
+    <p:tnLst>
+      <p:par>
+        <p:cTn id="1" dur="indefinite" restart="never" nodeType="tmRoot"/>
+      </p:par>
+    </p:tnLst>
+  </p:timing>
 </p:sld>
 </file>
 
@@ -4068,6 +4101,13 @@
   <p:clrMapOvr>
     <a:masterClrMapping/>
   </p:clrMapOvr>
+  <p:timing>
+    <p:tnLst>
+      <p:par>
+        <p:cTn id="1" dur="indefinite" restart="never" nodeType="tmRoot"/>
+      </p:par>
+    </p:tnLst>
+  </p:timing>
 </p:sld>
 </file>
 
@@ -4313,6 +4353,13 @@
   <p:clrMapOvr>
     <a:masterClrMapping/>
   </p:clrMapOvr>
+  <p:timing>
+    <p:tnLst>
+      <p:par>
+        <p:cTn id="1" dur="indefinite" restart="never" nodeType="tmRoot"/>
+      </p:par>
+    </p:tnLst>
+  </p:timing>
 </p:sld>
 </file>
 
@@ -4505,6 +4552,13 @@
   <p:clrMapOvr>
     <a:masterClrMapping/>
   </p:clrMapOvr>
+  <p:timing>
+    <p:tnLst>
+      <p:par>
+        <p:cTn id="1" dur="indefinite" restart="never" nodeType="tmRoot"/>
+      </p:par>
+    </p:tnLst>
+  </p:timing>
 </p:sld>
 </file>
 
@@ -6764,6 +6818,13 @@
   <p:clrMapOvr>
     <a:masterClrMapping/>
   </p:clrMapOvr>
+  <p:timing>
+    <p:tnLst>
+      <p:par>
+        <p:cTn id="1" dur="indefinite" restart="never" nodeType="tmRoot"/>
+      </p:par>
+    </p:tnLst>
+  </p:timing>
 </p:sld>
 </file>
 
@@ -6851,6 +6912,13 @@
   <p:clrMapOvr>
     <a:masterClrMapping/>
   </p:clrMapOvr>
+  <p:timing>
+    <p:tnLst>
+      <p:par>
+        <p:cTn id="1" dur="indefinite" restart="never" nodeType="tmRoot"/>
+      </p:par>
+    </p:tnLst>
+  </p:timing>
 </p:sld>
 </file>
 
@@ -6985,6 +7053,13 @@
   <p:clrMapOvr>
     <a:masterClrMapping/>
   </p:clrMapOvr>
+  <p:timing>
+    <p:tnLst>
+      <p:par>
+        <p:cTn id="1" dur="indefinite" restart="never" nodeType="tmRoot"/>
+      </p:par>
+    </p:tnLst>
+  </p:timing>
 </p:sld>
 </file>
 
@@ -7172,6 +7247,13 @@
   <p:clrMapOvr>
     <a:masterClrMapping/>
   </p:clrMapOvr>
+  <p:timing>
+    <p:tnLst>
+      <p:par>
+        <p:cTn id="1" dur="indefinite" restart="never" nodeType="tmRoot"/>
+      </p:par>
+    </p:tnLst>
+  </p:timing>
 </p:sld>
 </file>
 
@@ -7264,6 +7346,13 @@
   <p:clrMapOvr>
     <a:masterClrMapping/>
   </p:clrMapOvr>
+  <p:timing>
+    <p:tnLst>
+      <p:par>
+        <p:cTn id="1" dur="indefinite" restart="never" nodeType="tmRoot"/>
+      </p:par>
+    </p:tnLst>
+  </p:timing>
 </p:sld>
 </file>
 
@@ -7405,6 +7494,13 @@
   <p:clrMapOvr>
     <a:masterClrMapping/>
   </p:clrMapOvr>
+  <p:timing>
+    <p:tnLst>
+      <p:par>
+        <p:cTn id="1" dur="indefinite" restart="never" nodeType="tmRoot"/>
+      </p:par>
+    </p:tnLst>
+  </p:timing>
 </p:sld>
 </file>
 
@@ -7587,6 +7683,13 @@
   <p:clrMapOvr>
     <a:masterClrMapping/>
   </p:clrMapOvr>
+  <p:timing>
+    <p:tnLst>
+      <p:par>
+        <p:cTn id="1" dur="indefinite" restart="never" nodeType="tmRoot"/>
+      </p:par>
+    </p:tnLst>
+  </p:timing>
 </p:sld>
 </file>
 

</xml_diff>